<commit_message>
Fixed typo on .pptx
</commit_message>
<xml_diff>
--- a/VaccineCredentialExample.pptx
+++ b/VaccineCredentialExample.pptx
@@ -107,6 +107,11 @@
       </a:defRPr>
     </a:lvl9pPr>
   </p:defaultTextStyle>
+  <p:extLst>
+    <p:ext uri="{EFAFB233-063F-42B5-8137-9DF3F51BA10A}">
+      <p15:sldGuideLst xmlns:p15="http://schemas.microsoft.com/office/powerpoint/2012/main"/>
+    </p:ext>
+  </p:extLst>
 </p:presentation>
 </file>
 
@@ -3641,7 +3646,7 @@
           <a:p>
             <a:r>
               <a:rPr lang="en-US" dirty="0"/>
-              <a:t>Server app “authenticates” user by displaying the user’s Digital Identity Document. For added sophistication, the app could only issue certificates with certain DID characteristics (i.e. only from a given country, or only a certain age, </a:t>
+              <a:t>Server app “authenticates” user by displaying the user’s Digital Identity Document. For added sophistication, the app could only issue certificates to users with certain DID characteristics (i.e. only from a given country, or only a certain age, </a:t>
             </a:r>
             <a:r>
               <a:rPr lang="en-US" dirty="0" err="1"/>

</xml_diff>